<commit_message>
move instr cycles to lsn 7 from lsn 8; require own tst cases in lab; update q on compex
</commit_message>
<xml_diff>
--- a/notes/L7/Lsn7.pptx
+++ b/notes/L7/Lsn7.pptx
@@ -9419,7 +9419,19 @@
           <a:p>
             <a:r>
               <a:rPr lang="en-US" b="1" dirty="0" smtClean="0"/>
-              <a:t>Find the errors in this program</a:t>
+              <a:t>Find the errors </a:t>
+            </a:r>
+            <a:r>
+              <a:rPr lang="en-US" b="1" smtClean="0"/>
+              <a:t>in </a:t>
+            </a:r>
+            <a:r>
+              <a:rPr lang="en-US" b="1" smtClean="0"/>
+              <a:t>badlec5.asm </a:t>
+            </a:r>
+            <a:r>
+              <a:rPr lang="en-US" b="1" dirty="0" smtClean="0"/>
+              <a:t>program</a:t>
             </a:r>
             <a:endParaRPr lang="en-US" dirty="0"/>
           </a:p>
@@ -9448,65 +9460,6 @@
             <a:pPr marL="0" indent="0">
               <a:buNone/>
             </a:pPr>
-            <a:r>
-              <a:rPr lang="en-US" sz="1400" dirty="0">
-                <a:latin typeface="Courier New" pitchFamily="49" charset="0"/>
-                <a:cs typeface="Courier New" pitchFamily="49" charset="0"/>
-                <a:hlinkClick r:id="rId2"/>
-              </a:rPr>
-              <a:t>http://</a:t>
-            </a:r>
-            <a:r>
-              <a:rPr lang="en-US" sz="1400" dirty="0" smtClean="0">
-                <a:latin typeface="Courier New" pitchFamily="49" charset="0"/>
-                <a:cs typeface="Courier New" pitchFamily="49" charset="0"/>
-                <a:hlinkClick r:id="rId2"/>
-              </a:rPr>
-              <a:t>ecse.bd.psu.edu/cmpen352/lecture/lecture05.html</a:t>
-            </a:r>
-            <a:endParaRPr lang="en-US" sz="1400" dirty="0" smtClean="0">
-              <a:latin typeface="Courier New" pitchFamily="49" charset="0"/>
-              <a:cs typeface="Courier New" pitchFamily="49" charset="0"/>
-            </a:endParaRPr>
-          </a:p>
-          <a:p>
-            <a:pPr marL="0" indent="0">
-              <a:buNone/>
-            </a:pPr>
-            <a:endParaRPr lang="en-US" sz="1400" dirty="0" smtClean="0">
-              <a:latin typeface="Courier New" pitchFamily="49" charset="0"/>
-              <a:cs typeface="Courier New" pitchFamily="49" charset="0"/>
-            </a:endParaRPr>
-          </a:p>
-          <a:p>
-            <a:pPr marL="0" indent="0">
-              <a:buNone/>
-            </a:pPr>
-            <a:r>
-              <a:rPr lang="en-US" sz="1400" dirty="0">
-                <a:latin typeface="Courier New" pitchFamily="49" charset="0"/>
-                <a:cs typeface="Courier New" pitchFamily="49" charset="0"/>
-                <a:hlinkClick r:id="rId3"/>
-              </a:rPr>
-              <a:t>http://</a:t>
-            </a:r>
-            <a:r>
-              <a:rPr lang="en-US" sz="1400" dirty="0" smtClean="0">
-                <a:latin typeface="Courier New" pitchFamily="49" charset="0"/>
-                <a:cs typeface="Courier New" pitchFamily="49" charset="0"/>
-                <a:hlinkClick r:id="rId3"/>
-              </a:rPr>
-              <a:t>ecse.bd.psu.edu/cmpen352/lecture/code/badlec5.asm</a:t>
-            </a:r>
-            <a:endParaRPr lang="en-US" sz="1400" dirty="0" smtClean="0">
-              <a:latin typeface="Courier New" pitchFamily="49" charset="0"/>
-              <a:cs typeface="Courier New" pitchFamily="49" charset="0"/>
-            </a:endParaRPr>
-          </a:p>
-          <a:p>
-            <a:pPr marL="0" indent="0">
-              <a:buNone/>
-            </a:pPr>
             <a:endParaRPr lang="en-US" sz="1400" dirty="0" smtClean="0">
               <a:latin typeface="Courier New" pitchFamily="49" charset="0"/>
               <a:cs typeface="Courier New" pitchFamily="49" charset="0"/>
@@ -9826,7 +9779,7 @@
           <p:nvPr/>
         </p:nvPicPr>
         <p:blipFill>
-          <a:blip r:embed="rId4">
+          <a:blip r:embed="rId2">
             <a:extLst>
               <a:ext uri="{28A0092B-C50C-407E-A947-70E740481C1C}">
                 <a14:useLocalDpi xmlns:a14="http://schemas.microsoft.com/office/drawing/2010/main" val="0"/>

</xml_diff>